<commit_message>
MLTP02 - Team 13 - Petfinder Presentation
MLTP02 - Team 13 - Petfinder Presentation
</commit_message>
<xml_diff>
--- a/MLTP02 - PetFinder.pptx
+++ b/MLTP02 - PetFinder.pptx
@@ -46748,7 +46748,7 @@
         <p:spPr>
           <a:xfrm>
             <a:off x="94675" y="1070575"/>
-            <a:ext cx="5125800" cy="415500"/>
+            <a:ext cx="5125800" cy="620652"/>
           </a:xfrm>
           <a:prstGeom prst="rect">
             <a:avLst/>
@@ -46774,7 +46774,7 @@
               <a:buNone/>
             </a:pPr>
             <a:r>
-              <a:rPr lang="en" sz="1500" b="1">
+              <a:rPr lang="en" sz="1500" b="1" dirty="0">
                 <a:solidFill>
                   <a:schemeClr val="dk1"/>
                 </a:solidFill>
@@ -46783,9 +46783,9 @@
                 <a:cs typeface="Hind Madurai"/>
                 <a:sym typeface="Hind Madurai"/>
               </a:rPr>
-              <a:t>0 - Don’t have a name    1 - Have a name</a:t>
+              <a:t>0 – Doesn’t have a name    1 - Has a name</a:t>
             </a:r>
-            <a:endParaRPr sz="1500" b="1">
+            <a:endParaRPr sz="1500" b="1" dirty="0">
               <a:solidFill>
                 <a:schemeClr val="dk1"/>
               </a:solidFill>

</xml_diff>